<commit_message>
Updated Presentation and Analysis
Updated presentation and analysis documents.
</commit_message>
<xml_diff>
--- a/Presentation and Analysis/US Housing Market Analysis_Draft_1-18-2020.pptx
+++ b/Presentation and Analysis/US Housing Market Analysis_Draft_1-18-2020.pptx
@@ -1981,7 +1981,7 @@
         <a:p>
           <a:r>
             <a:rPr lang="en-US" dirty="0"/>
-            <a:t>Median housing prices steadily increased nationwide starting around 2011-2012</a:t>
+            <a:t>Median prices sales prices for homes steadily increased nationwide starting around 2011-2012</a:t>
           </a:r>
         </a:p>
       </dgm:t>
@@ -3892,7 +3892,7 @@
           </a:pPr>
           <a:r>
             <a:rPr lang="en-US" sz="1400" kern="1200" dirty="0"/>
-            <a:t>Median housing prices steadily increased nationwide starting around 2011-2012</a:t>
+            <a:t>Median prices sales prices for homes steadily increased nationwide starting around 2011-2012</a:t>
           </a:r>
         </a:p>
         <a:p>
@@ -12417,8 +12417,8 @@
         </p:nvSpPr>
         <p:spPr bwMode="auto">
           <a:xfrm>
-            <a:off x="1330325" y="1587952"/>
-            <a:ext cx="6826250" cy="843487"/>
+            <a:off x="924408" y="1587952"/>
+            <a:ext cx="7295184" cy="843487"/>
           </a:xfrm>
           <a:prstGeom prst="rect">
             <a:avLst/>
@@ -19611,7 +19611,7 @@
             <p:ph idx="1"/>
             <p:extLst>
               <p:ext uri="{D42A27DB-BD31-4B8C-83A1-F6EECF244321}">
-                <p14:modId xmlns:p14="http://schemas.microsoft.com/office/powerpoint/2010/main" val="3740863412"/>
+                <p14:modId xmlns:p14="http://schemas.microsoft.com/office/powerpoint/2010/main" val="2958056175"/>
               </p:ext>
             </p:extLst>
           </p:nvPr>
@@ -20702,7 +20702,7 @@
                 </a:solidFill>
                 <a:latin typeface="Arial" panose="020B0604020202020204" pitchFamily="34" charset="0"/>
               </a:rPr>
-              <a:t>What consumer/market variables affected median housing prices since 2008?</a:t>
+              <a:t>What consumer/market variables affected median sales prices for homes since 2008?</a:t>
             </a:r>
           </a:p>
           <a:p>

</xml_diff>